<commit_message>
done upto lasso update, ongoing iconic drag interaction, graph label add and funcion implementation
</commit_message>
<xml_diff>
--- a/Embodied-Graphs-2D/Assets/Sprites/sprites.pptx
+++ b/Embodied-Graphs-2D/Assets/Sprites/sprites.pptx
@@ -243,7 +243,7 @@
           <a:p>
             <a:fld id="{6E161932-A9F5-48B5-90C6-DA3283E741C7}" type="datetimeFigureOut">
               <a:rPr lang="en-US" smtClean="0"/>
-              <a:t>04-Jan-21</a:t>
+              <a:t>27-Jan-21</a:t>
             </a:fld>
             <a:endParaRPr lang="en-US"/>
           </a:p>
@@ -413,7 +413,7 @@
           <a:p>
             <a:fld id="{6E161932-A9F5-48B5-90C6-DA3283E741C7}" type="datetimeFigureOut">
               <a:rPr lang="en-US" smtClean="0"/>
-              <a:t>04-Jan-21</a:t>
+              <a:t>27-Jan-21</a:t>
             </a:fld>
             <a:endParaRPr lang="en-US"/>
           </a:p>
@@ -593,7 +593,7 @@
           <a:p>
             <a:fld id="{6E161932-A9F5-48B5-90C6-DA3283E741C7}" type="datetimeFigureOut">
               <a:rPr lang="en-US" smtClean="0"/>
-              <a:t>04-Jan-21</a:t>
+              <a:t>27-Jan-21</a:t>
             </a:fld>
             <a:endParaRPr lang="en-US"/>
           </a:p>
@@ -763,7 +763,7 @@
           <a:p>
             <a:fld id="{6E161932-A9F5-48B5-90C6-DA3283E741C7}" type="datetimeFigureOut">
               <a:rPr lang="en-US" smtClean="0"/>
-              <a:t>04-Jan-21</a:t>
+              <a:t>27-Jan-21</a:t>
             </a:fld>
             <a:endParaRPr lang="en-US"/>
           </a:p>
@@ -1009,7 +1009,7 @@
           <a:p>
             <a:fld id="{6E161932-A9F5-48B5-90C6-DA3283E741C7}" type="datetimeFigureOut">
               <a:rPr lang="en-US" smtClean="0"/>
-              <a:t>04-Jan-21</a:t>
+              <a:t>27-Jan-21</a:t>
             </a:fld>
             <a:endParaRPr lang="en-US"/>
           </a:p>
@@ -1241,7 +1241,7 @@
           <a:p>
             <a:fld id="{6E161932-A9F5-48B5-90C6-DA3283E741C7}" type="datetimeFigureOut">
               <a:rPr lang="en-US" smtClean="0"/>
-              <a:t>04-Jan-21</a:t>
+              <a:t>27-Jan-21</a:t>
             </a:fld>
             <a:endParaRPr lang="en-US"/>
           </a:p>
@@ -1608,7 +1608,7 @@
           <a:p>
             <a:fld id="{6E161932-A9F5-48B5-90C6-DA3283E741C7}" type="datetimeFigureOut">
               <a:rPr lang="en-US" smtClean="0"/>
-              <a:t>04-Jan-21</a:t>
+              <a:t>27-Jan-21</a:t>
             </a:fld>
             <a:endParaRPr lang="en-US"/>
           </a:p>
@@ -1726,7 +1726,7 @@
           <a:p>
             <a:fld id="{6E161932-A9F5-48B5-90C6-DA3283E741C7}" type="datetimeFigureOut">
               <a:rPr lang="en-US" smtClean="0"/>
-              <a:t>04-Jan-21</a:t>
+              <a:t>27-Jan-21</a:t>
             </a:fld>
             <a:endParaRPr lang="en-US"/>
           </a:p>
@@ -1821,7 +1821,7 @@
           <a:p>
             <a:fld id="{6E161932-A9F5-48B5-90C6-DA3283E741C7}" type="datetimeFigureOut">
               <a:rPr lang="en-US" smtClean="0"/>
-              <a:t>04-Jan-21</a:t>
+              <a:t>27-Jan-21</a:t>
             </a:fld>
             <a:endParaRPr lang="en-US"/>
           </a:p>
@@ -2098,7 +2098,7 @@
           <a:p>
             <a:fld id="{6E161932-A9F5-48B5-90C6-DA3283E741C7}" type="datetimeFigureOut">
               <a:rPr lang="en-US" smtClean="0"/>
-              <a:t>04-Jan-21</a:t>
+              <a:t>27-Jan-21</a:t>
             </a:fld>
             <a:endParaRPr lang="en-US"/>
           </a:p>
@@ -2351,7 +2351,7 @@
           <a:p>
             <a:fld id="{6E161932-A9F5-48B5-90C6-DA3283E741C7}" type="datetimeFigureOut">
               <a:rPr lang="en-US" smtClean="0"/>
-              <a:t>04-Jan-21</a:t>
+              <a:t>27-Jan-21</a:t>
             </a:fld>
             <a:endParaRPr lang="en-US"/>
           </a:p>
@@ -2564,7 +2564,7 @@
           <a:p>
             <a:fld id="{6E161932-A9F5-48B5-90C6-DA3283E741C7}" type="datetimeFigureOut">
               <a:rPr lang="en-US" smtClean="0"/>
-              <a:t>04-Jan-21</a:t>
+              <a:t>27-Jan-21</a:t>
             </a:fld>
             <a:endParaRPr lang="en-US"/>
           </a:p>
@@ -2991,7 +2991,7 @@
         </p:blipFill>
         <p:spPr>
           <a:xfrm>
-            <a:off x="1197612" y="742122"/>
+            <a:off x="1183930" y="742121"/>
             <a:ext cx="785298" cy="788504"/>
           </a:xfrm>
           <a:prstGeom prst="rect">
@@ -3007,7 +3007,7 @@
         </p:nvSpPr>
         <p:spPr>
           <a:xfrm>
-            <a:off x="2213113" y="742121"/>
+            <a:off x="3896139" y="742121"/>
             <a:ext cx="927652" cy="1497495"/>
           </a:xfrm>
           <a:prstGeom prst="blockArc">
@@ -3063,7 +3063,7 @@
         </p:nvSpPr>
         <p:spPr>
           <a:xfrm rot="10800000">
-            <a:off x="3370968" y="33130"/>
+            <a:off x="4921474" y="33130"/>
             <a:ext cx="927652" cy="1497495"/>
           </a:xfrm>
           <a:prstGeom prst="blockArc">
@@ -3119,7 +3119,7 @@
         </p:nvSpPr>
         <p:spPr>
           <a:xfrm>
-            <a:off x="4345857" y="599660"/>
+            <a:off x="5896363" y="599660"/>
             <a:ext cx="1098219" cy="1073427"/>
           </a:xfrm>
           <a:prstGeom prst="mathPlus">
@@ -3264,6 +3264,66 @@
           </a:p>
         </p:txBody>
       </p:sp>
+      <p:pic>
+        <p:nvPicPr>
+          <p:cNvPr id="11" name="Picture 10"/>
+          <p:cNvPicPr>
+            <a:picLocks noChangeAspect="1"/>
+          </p:cNvPicPr>
+          <p:nvPr/>
+        </p:nvPicPr>
+        <p:blipFill>
+          <a:blip r:embed="rId2" cstate="print">
+            <a:extLst>
+              <a:ext uri="{28A0092B-C50C-407E-A947-70E740481C1C}">
+                <a14:useLocalDpi xmlns:a14="http://schemas.microsoft.com/office/drawing/2010/main" val="0"/>
+              </a:ext>
+            </a:extLst>
+          </a:blip>
+          <a:stretch>
+            <a:fillRect/>
+          </a:stretch>
+        </p:blipFill>
+        <p:spPr>
+          <a:xfrm>
+            <a:off x="2101003" y="742121"/>
+            <a:ext cx="785298" cy="788504"/>
+          </a:xfrm>
+          <a:prstGeom prst="rect">
+            <a:avLst/>
+          </a:prstGeom>
+        </p:spPr>
+      </p:pic>
+      <p:pic>
+        <p:nvPicPr>
+          <p:cNvPr id="12" name="Picture 11"/>
+          <p:cNvPicPr>
+            <a:picLocks noChangeAspect="1"/>
+          </p:cNvPicPr>
+          <p:nvPr/>
+        </p:nvPicPr>
+        <p:blipFill>
+          <a:blip r:embed="rId2" cstate="print">
+            <a:extLst>
+              <a:ext uri="{28A0092B-C50C-407E-A947-70E740481C1C}">
+                <a14:useLocalDpi xmlns:a14="http://schemas.microsoft.com/office/drawing/2010/main" val="0"/>
+              </a:ext>
+            </a:extLst>
+          </a:blip>
+          <a:stretch>
+            <a:fillRect/>
+          </a:stretch>
+        </p:blipFill>
+        <p:spPr>
+          <a:xfrm>
+            <a:off x="3005197" y="742121"/>
+            <a:ext cx="785298" cy="788504"/>
+          </a:xfrm>
+          <a:prstGeom prst="rect">
+            <a:avLst/>
+          </a:prstGeom>
+        </p:spPr>
+      </p:pic>
     </p:spTree>
     <p:extLst>
       <p:ext uri="{BB962C8B-B14F-4D97-AF65-F5344CB8AC3E}">

</xml_diff>

<commit_message>
polishing: vertical menu, vp drag & draw, func menu amb resolve and minors
</commit_message>
<xml_diff>
--- a/Embodied-Graphs-2D/Assets/Sprites/sprites.pptx
+++ b/Embodied-Graphs-2D/Assets/Sprites/sprites.pptx
@@ -243,7 +243,7 @@
           <a:p>
             <a:fld id="{6E161932-A9F5-48B5-90C6-DA3283E741C7}" type="datetimeFigureOut">
               <a:rPr lang="en-US" smtClean="0"/>
-              <a:t>27-Jan-21</a:t>
+              <a:t>02-Mar-21</a:t>
             </a:fld>
             <a:endParaRPr lang="en-US"/>
           </a:p>
@@ -413,7 +413,7 @@
           <a:p>
             <a:fld id="{6E161932-A9F5-48B5-90C6-DA3283E741C7}" type="datetimeFigureOut">
               <a:rPr lang="en-US" smtClean="0"/>
-              <a:t>27-Jan-21</a:t>
+              <a:t>02-Mar-21</a:t>
             </a:fld>
             <a:endParaRPr lang="en-US"/>
           </a:p>
@@ -593,7 +593,7 @@
           <a:p>
             <a:fld id="{6E161932-A9F5-48B5-90C6-DA3283E741C7}" type="datetimeFigureOut">
               <a:rPr lang="en-US" smtClean="0"/>
-              <a:t>27-Jan-21</a:t>
+              <a:t>02-Mar-21</a:t>
             </a:fld>
             <a:endParaRPr lang="en-US"/>
           </a:p>
@@ -763,7 +763,7 @@
           <a:p>
             <a:fld id="{6E161932-A9F5-48B5-90C6-DA3283E741C7}" type="datetimeFigureOut">
               <a:rPr lang="en-US" smtClean="0"/>
-              <a:t>27-Jan-21</a:t>
+              <a:t>02-Mar-21</a:t>
             </a:fld>
             <a:endParaRPr lang="en-US"/>
           </a:p>
@@ -1009,7 +1009,7 @@
           <a:p>
             <a:fld id="{6E161932-A9F5-48B5-90C6-DA3283E741C7}" type="datetimeFigureOut">
               <a:rPr lang="en-US" smtClean="0"/>
-              <a:t>27-Jan-21</a:t>
+              <a:t>02-Mar-21</a:t>
             </a:fld>
             <a:endParaRPr lang="en-US"/>
           </a:p>
@@ -1241,7 +1241,7 @@
           <a:p>
             <a:fld id="{6E161932-A9F5-48B5-90C6-DA3283E741C7}" type="datetimeFigureOut">
               <a:rPr lang="en-US" smtClean="0"/>
-              <a:t>27-Jan-21</a:t>
+              <a:t>02-Mar-21</a:t>
             </a:fld>
             <a:endParaRPr lang="en-US"/>
           </a:p>
@@ -1608,7 +1608,7 @@
           <a:p>
             <a:fld id="{6E161932-A9F5-48B5-90C6-DA3283E741C7}" type="datetimeFigureOut">
               <a:rPr lang="en-US" smtClean="0"/>
-              <a:t>27-Jan-21</a:t>
+              <a:t>02-Mar-21</a:t>
             </a:fld>
             <a:endParaRPr lang="en-US"/>
           </a:p>
@@ -1726,7 +1726,7 @@
           <a:p>
             <a:fld id="{6E161932-A9F5-48B5-90C6-DA3283E741C7}" type="datetimeFigureOut">
               <a:rPr lang="en-US" smtClean="0"/>
-              <a:t>27-Jan-21</a:t>
+              <a:t>02-Mar-21</a:t>
             </a:fld>
             <a:endParaRPr lang="en-US"/>
           </a:p>
@@ -1821,7 +1821,7 @@
           <a:p>
             <a:fld id="{6E161932-A9F5-48B5-90C6-DA3283E741C7}" type="datetimeFigureOut">
               <a:rPr lang="en-US" smtClean="0"/>
-              <a:t>27-Jan-21</a:t>
+              <a:t>02-Mar-21</a:t>
             </a:fld>
             <a:endParaRPr lang="en-US"/>
           </a:p>
@@ -2098,7 +2098,7 @@
           <a:p>
             <a:fld id="{6E161932-A9F5-48B5-90C6-DA3283E741C7}" type="datetimeFigureOut">
               <a:rPr lang="en-US" smtClean="0"/>
-              <a:t>27-Jan-21</a:t>
+              <a:t>02-Mar-21</a:t>
             </a:fld>
             <a:endParaRPr lang="en-US"/>
           </a:p>
@@ -2351,7 +2351,7 @@
           <a:p>
             <a:fld id="{6E161932-A9F5-48B5-90C6-DA3283E741C7}" type="datetimeFigureOut">
               <a:rPr lang="en-US" smtClean="0"/>
-              <a:t>27-Jan-21</a:t>
+              <a:t>02-Mar-21</a:t>
             </a:fld>
             <a:endParaRPr lang="en-US"/>
           </a:p>
@@ -2564,7 +2564,7 @@
           <a:p>
             <a:fld id="{6E161932-A9F5-48B5-90C6-DA3283E741C7}" type="datetimeFigureOut">
               <a:rPr lang="en-US" smtClean="0"/>
-              <a:t>27-Jan-21</a:t>
+              <a:t>02-Mar-21</a:t>
             </a:fld>
             <a:endParaRPr lang="en-US"/>
           </a:p>
@@ -3324,6 +3324,107 @@
           </a:prstGeom>
         </p:spPr>
       </p:pic>
+      <p:sp>
+        <p:nvSpPr>
+          <p:cNvPr id="15" name="Oval 14"/>
+          <p:cNvSpPr/>
+          <p:nvPr/>
+        </p:nvSpPr>
+        <p:spPr>
+          <a:xfrm>
+            <a:off x="2667029" y="4343824"/>
+            <a:ext cx="286631" cy="331306"/>
+          </a:xfrm>
+          <a:prstGeom prst="ellipse">
+            <a:avLst/>
+          </a:prstGeom>
+          <a:noFill/>
+          <a:ln w="19050">
+            <a:solidFill>
+              <a:schemeClr val="tx1"/>
+            </a:solidFill>
+          </a:ln>
+        </p:spPr>
+        <p:style>
+          <a:lnRef idx="2">
+            <a:schemeClr val="accent1">
+              <a:shade val="50000"/>
+            </a:schemeClr>
+          </a:lnRef>
+          <a:fillRef idx="1">
+            <a:schemeClr val="accent1"/>
+          </a:fillRef>
+          <a:effectRef idx="0">
+            <a:schemeClr val="accent1"/>
+          </a:effectRef>
+          <a:fontRef idx="minor">
+            <a:schemeClr val="lt1"/>
+          </a:fontRef>
+        </p:style>
+        <p:txBody>
+          <a:bodyPr rtlCol="0" anchor="ctr"/>
+          <a:lstStyle/>
+          <a:p>
+            <a:pPr algn="ctr"/>
+            <a:endParaRPr lang="en-US"/>
+          </a:p>
+        </p:txBody>
+      </p:sp>
+      <p:sp>
+        <p:nvSpPr>
+          <p:cNvPr id="16" name="Equal 15"/>
+          <p:cNvSpPr/>
+          <p:nvPr/>
+        </p:nvSpPr>
+        <p:spPr>
+          <a:xfrm>
+            <a:off x="2734389" y="4399721"/>
+            <a:ext cx="151912" cy="219512"/>
+          </a:xfrm>
+          <a:prstGeom prst="mathEqual">
+            <a:avLst>
+              <a:gd name="adj1" fmla="val 15761"/>
+              <a:gd name="adj2" fmla="val 16889"/>
+            </a:avLst>
+          </a:prstGeom>
+          <a:solidFill>
+            <a:schemeClr val="tx1"/>
+          </a:solidFill>
+          <a:ln w="3175">
+            <a:solidFill>
+              <a:schemeClr val="tx1"/>
+            </a:solidFill>
+          </a:ln>
+        </p:spPr>
+        <p:style>
+          <a:lnRef idx="2">
+            <a:schemeClr val="accent1">
+              <a:shade val="50000"/>
+            </a:schemeClr>
+          </a:lnRef>
+          <a:fillRef idx="1">
+            <a:schemeClr val="accent1"/>
+          </a:fillRef>
+          <a:effectRef idx="0">
+            <a:schemeClr val="accent1"/>
+          </a:effectRef>
+          <a:fontRef idx="minor">
+            <a:schemeClr val="lt1"/>
+          </a:fontRef>
+        </p:style>
+        <p:txBody>
+          <a:bodyPr rtlCol="0" anchor="ctr"/>
+          <a:lstStyle/>
+          <a:p>
+            <a:pPr algn="ctr"/>
+            <a:endParaRPr lang="en-US">
+              <a:solidFill>
+                <a:schemeClr val="tx1"/>
+              </a:solidFill>
+            </a:endParaRPr>
+          </a:p>
+        </p:txBody>
+      </p:sp>
     </p:spTree>
     <p:extLst>
       <p:ext uri="{BB962C8B-B14F-4D97-AF65-F5344CB8AC3E}">

</xml_diff>

<commit_message>
video play/pause handled with function call, jsons deleted after work for build compilability
</commit_message>
<xml_diff>
--- a/Embodied-Graphs-2D/Assets/Sprites/sprites.pptx
+++ b/Embodied-Graphs-2D/Assets/Sprites/sprites.pptx
@@ -243,7 +243,7 @@
           <a:p>
             <a:fld id="{6E161932-A9F5-48B5-90C6-DA3283E741C7}" type="datetimeFigureOut">
               <a:rPr lang="en-US" smtClean="0"/>
-              <a:t>02-Mar-21</a:t>
+              <a:t>14-Mar-21</a:t>
             </a:fld>
             <a:endParaRPr lang="en-US"/>
           </a:p>
@@ -413,7 +413,7 @@
           <a:p>
             <a:fld id="{6E161932-A9F5-48B5-90C6-DA3283E741C7}" type="datetimeFigureOut">
               <a:rPr lang="en-US" smtClean="0"/>
-              <a:t>02-Mar-21</a:t>
+              <a:t>14-Mar-21</a:t>
             </a:fld>
             <a:endParaRPr lang="en-US"/>
           </a:p>
@@ -593,7 +593,7 @@
           <a:p>
             <a:fld id="{6E161932-A9F5-48B5-90C6-DA3283E741C7}" type="datetimeFigureOut">
               <a:rPr lang="en-US" smtClean="0"/>
-              <a:t>02-Mar-21</a:t>
+              <a:t>14-Mar-21</a:t>
             </a:fld>
             <a:endParaRPr lang="en-US"/>
           </a:p>
@@ -763,7 +763,7 @@
           <a:p>
             <a:fld id="{6E161932-A9F5-48B5-90C6-DA3283E741C7}" type="datetimeFigureOut">
               <a:rPr lang="en-US" smtClean="0"/>
-              <a:t>02-Mar-21</a:t>
+              <a:t>14-Mar-21</a:t>
             </a:fld>
             <a:endParaRPr lang="en-US"/>
           </a:p>
@@ -1009,7 +1009,7 @@
           <a:p>
             <a:fld id="{6E161932-A9F5-48B5-90C6-DA3283E741C7}" type="datetimeFigureOut">
               <a:rPr lang="en-US" smtClean="0"/>
-              <a:t>02-Mar-21</a:t>
+              <a:t>14-Mar-21</a:t>
             </a:fld>
             <a:endParaRPr lang="en-US"/>
           </a:p>
@@ -1241,7 +1241,7 @@
           <a:p>
             <a:fld id="{6E161932-A9F5-48B5-90C6-DA3283E741C7}" type="datetimeFigureOut">
               <a:rPr lang="en-US" smtClean="0"/>
-              <a:t>02-Mar-21</a:t>
+              <a:t>14-Mar-21</a:t>
             </a:fld>
             <a:endParaRPr lang="en-US"/>
           </a:p>
@@ -1608,7 +1608,7 @@
           <a:p>
             <a:fld id="{6E161932-A9F5-48B5-90C6-DA3283E741C7}" type="datetimeFigureOut">
               <a:rPr lang="en-US" smtClean="0"/>
-              <a:t>02-Mar-21</a:t>
+              <a:t>14-Mar-21</a:t>
             </a:fld>
             <a:endParaRPr lang="en-US"/>
           </a:p>
@@ -1726,7 +1726,7 @@
           <a:p>
             <a:fld id="{6E161932-A9F5-48B5-90C6-DA3283E741C7}" type="datetimeFigureOut">
               <a:rPr lang="en-US" smtClean="0"/>
-              <a:t>02-Mar-21</a:t>
+              <a:t>14-Mar-21</a:t>
             </a:fld>
             <a:endParaRPr lang="en-US"/>
           </a:p>
@@ -1821,7 +1821,7 @@
           <a:p>
             <a:fld id="{6E161932-A9F5-48B5-90C6-DA3283E741C7}" type="datetimeFigureOut">
               <a:rPr lang="en-US" smtClean="0"/>
-              <a:t>02-Mar-21</a:t>
+              <a:t>14-Mar-21</a:t>
             </a:fld>
             <a:endParaRPr lang="en-US"/>
           </a:p>
@@ -2098,7 +2098,7 @@
           <a:p>
             <a:fld id="{6E161932-A9F5-48B5-90C6-DA3283E741C7}" type="datetimeFigureOut">
               <a:rPr lang="en-US" smtClean="0"/>
-              <a:t>02-Mar-21</a:t>
+              <a:t>14-Mar-21</a:t>
             </a:fld>
             <a:endParaRPr lang="en-US"/>
           </a:p>
@@ -2351,7 +2351,7 @@
           <a:p>
             <a:fld id="{6E161932-A9F5-48B5-90C6-DA3283E741C7}" type="datetimeFigureOut">
               <a:rPr lang="en-US" smtClean="0"/>
-              <a:t>02-Mar-21</a:t>
+              <a:t>14-Mar-21</a:t>
             </a:fld>
             <a:endParaRPr lang="en-US"/>
           </a:p>
@@ -2564,7 +2564,7 @@
           <a:p>
             <a:fld id="{6E161932-A9F5-48B5-90C6-DA3283E741C7}" type="datetimeFigureOut">
               <a:rPr lang="en-US" smtClean="0"/>
-              <a:t>02-Mar-21</a:t>
+              <a:t>14-Mar-21</a:t>
             </a:fld>
             <a:endParaRPr lang="en-US"/>
           </a:p>
@@ -3161,109 +3161,6 @@
           </a:p>
         </p:txBody>
       </p:sp>
-      <p:sp>
-        <p:nvSpPr>
-          <p:cNvPr id="2" name="Oval 1"/>
-          <p:cNvSpPr/>
-          <p:nvPr/>
-        </p:nvSpPr>
-        <p:spPr>
-          <a:xfrm>
-            <a:off x="1156326" y="4317319"/>
-            <a:ext cx="286631" cy="331306"/>
-          </a:xfrm>
-          <a:prstGeom prst="ellipse">
-            <a:avLst/>
-          </a:prstGeom>
-          <a:solidFill>
-            <a:schemeClr val="bg1"/>
-          </a:solidFill>
-          <a:ln w="19050">
-            <a:solidFill>
-              <a:schemeClr val="tx1"/>
-            </a:solidFill>
-          </a:ln>
-        </p:spPr>
-        <p:style>
-          <a:lnRef idx="2">
-            <a:schemeClr val="accent1">
-              <a:shade val="50000"/>
-            </a:schemeClr>
-          </a:lnRef>
-          <a:fillRef idx="1">
-            <a:schemeClr val="accent1"/>
-          </a:fillRef>
-          <a:effectRef idx="0">
-            <a:schemeClr val="accent1"/>
-          </a:effectRef>
-          <a:fontRef idx="minor">
-            <a:schemeClr val="lt1"/>
-          </a:fontRef>
-        </p:style>
-        <p:txBody>
-          <a:bodyPr rtlCol="0" anchor="ctr"/>
-          <a:lstStyle/>
-          <a:p>
-            <a:pPr algn="ctr"/>
-            <a:endParaRPr lang="en-US"/>
-          </a:p>
-        </p:txBody>
-      </p:sp>
-      <p:sp>
-        <p:nvSpPr>
-          <p:cNvPr id="10" name="Equal 9"/>
-          <p:cNvSpPr/>
-          <p:nvPr/>
-        </p:nvSpPr>
-        <p:spPr>
-          <a:xfrm>
-            <a:off x="1223686" y="4373216"/>
-            <a:ext cx="151912" cy="219512"/>
-          </a:xfrm>
-          <a:prstGeom prst="mathEqual">
-            <a:avLst>
-              <a:gd name="adj1" fmla="val 15761"/>
-              <a:gd name="adj2" fmla="val 16889"/>
-            </a:avLst>
-          </a:prstGeom>
-          <a:solidFill>
-            <a:schemeClr val="tx1"/>
-          </a:solidFill>
-          <a:ln w="3175">
-            <a:solidFill>
-              <a:schemeClr val="tx1"/>
-            </a:solidFill>
-          </a:ln>
-        </p:spPr>
-        <p:style>
-          <a:lnRef idx="2">
-            <a:schemeClr val="accent1">
-              <a:shade val="50000"/>
-            </a:schemeClr>
-          </a:lnRef>
-          <a:fillRef idx="1">
-            <a:schemeClr val="accent1"/>
-          </a:fillRef>
-          <a:effectRef idx="0">
-            <a:schemeClr val="accent1"/>
-          </a:effectRef>
-          <a:fontRef idx="minor">
-            <a:schemeClr val="lt1"/>
-          </a:fontRef>
-        </p:style>
-        <p:txBody>
-          <a:bodyPr rtlCol="0" anchor="ctr"/>
-          <a:lstStyle/>
-          <a:p>
-            <a:pPr algn="ctr"/>
-            <a:endParaRPr lang="en-US">
-              <a:solidFill>
-                <a:schemeClr val="tx1"/>
-              </a:solidFill>
-            </a:endParaRPr>
-          </a:p>
-        </p:txBody>
-      </p:sp>
       <p:pic>
         <p:nvPicPr>
           <p:cNvPr id="11" name="Picture 10"/>
@@ -3324,107 +3221,6 @@
           </a:prstGeom>
         </p:spPr>
       </p:pic>
-      <p:sp>
-        <p:nvSpPr>
-          <p:cNvPr id="15" name="Oval 14"/>
-          <p:cNvSpPr/>
-          <p:nvPr/>
-        </p:nvSpPr>
-        <p:spPr>
-          <a:xfrm>
-            <a:off x="2667029" y="4343824"/>
-            <a:ext cx="286631" cy="331306"/>
-          </a:xfrm>
-          <a:prstGeom prst="ellipse">
-            <a:avLst/>
-          </a:prstGeom>
-          <a:noFill/>
-          <a:ln w="19050">
-            <a:solidFill>
-              <a:schemeClr val="tx1"/>
-            </a:solidFill>
-          </a:ln>
-        </p:spPr>
-        <p:style>
-          <a:lnRef idx="2">
-            <a:schemeClr val="accent1">
-              <a:shade val="50000"/>
-            </a:schemeClr>
-          </a:lnRef>
-          <a:fillRef idx="1">
-            <a:schemeClr val="accent1"/>
-          </a:fillRef>
-          <a:effectRef idx="0">
-            <a:schemeClr val="accent1"/>
-          </a:effectRef>
-          <a:fontRef idx="minor">
-            <a:schemeClr val="lt1"/>
-          </a:fontRef>
-        </p:style>
-        <p:txBody>
-          <a:bodyPr rtlCol="0" anchor="ctr"/>
-          <a:lstStyle/>
-          <a:p>
-            <a:pPr algn="ctr"/>
-            <a:endParaRPr lang="en-US"/>
-          </a:p>
-        </p:txBody>
-      </p:sp>
-      <p:sp>
-        <p:nvSpPr>
-          <p:cNvPr id="16" name="Equal 15"/>
-          <p:cNvSpPr/>
-          <p:nvPr/>
-        </p:nvSpPr>
-        <p:spPr>
-          <a:xfrm>
-            <a:off x="2734389" y="4399721"/>
-            <a:ext cx="151912" cy="219512"/>
-          </a:xfrm>
-          <a:prstGeom prst="mathEqual">
-            <a:avLst>
-              <a:gd name="adj1" fmla="val 15761"/>
-              <a:gd name="adj2" fmla="val 16889"/>
-            </a:avLst>
-          </a:prstGeom>
-          <a:solidFill>
-            <a:schemeClr val="tx1"/>
-          </a:solidFill>
-          <a:ln w="3175">
-            <a:solidFill>
-              <a:schemeClr val="tx1"/>
-            </a:solidFill>
-          </a:ln>
-        </p:spPr>
-        <p:style>
-          <a:lnRef idx="2">
-            <a:schemeClr val="accent1">
-              <a:shade val="50000"/>
-            </a:schemeClr>
-          </a:lnRef>
-          <a:fillRef idx="1">
-            <a:schemeClr val="accent1"/>
-          </a:fillRef>
-          <a:effectRef idx="0">
-            <a:schemeClr val="accent1"/>
-          </a:effectRef>
-          <a:fontRef idx="minor">
-            <a:schemeClr val="lt1"/>
-          </a:fontRef>
-        </p:style>
-        <p:txBody>
-          <a:bodyPr rtlCol="0" anchor="ctr"/>
-          <a:lstStyle/>
-          <a:p>
-            <a:pPr algn="ctr"/>
-            <a:endParaRPr lang="en-US">
-              <a:solidFill>
-                <a:schemeClr val="tx1"/>
-              </a:solidFill>
-            </a:endParaRPr>
-          </a:p>
-        </p:txBody>
-      </p:sp>
     </p:spTree>
     <p:extLst>
       <p:ext uri="{BB962C8B-B14F-4D97-AF65-F5344CB8AC3E}">

</xml_diff>